<commit_message>
Update qualitative analysis with codes counting.
</commit_message>
<xml_diff>
--- a/images/completion_times.pptx
+++ b/images/completion_times.pptx
@@ -2,12 +2,12 @@
 <file path=ppt/presentation.xml><?xml version="1.0" encoding="utf-8"?>
 <p:presentation xmlns:a="http://schemas.openxmlformats.org/drawingml/2006/main" xmlns:r="http://schemas.openxmlformats.org/officeDocument/2006/relationships" xmlns:p="http://schemas.openxmlformats.org/presentationml/2006/main" saveSubsetFonts="1">
   <p:sldMasterIdLst>
-    <p:sldMasterId id="2147483672" r:id="rId1"/>
+    <p:sldMasterId id="2147483696" r:id="rId1"/>
   </p:sldMasterIdLst>
   <p:sldIdLst>
     <p:sldId id="256" r:id="rId2"/>
   </p:sldIdLst>
-  <p:sldSz cx="9144000" cy="2514600"/>
+  <p:sldSz cx="11430000" cy="3200400"/>
   <p:notesSz cx="6858000" cy="9144000"/>
   <p:defaultTextStyle>
     <a:defPPr>
@@ -104,6 +104,11 @@
       </a:defRPr>
     </a:lvl9pPr>
   </p:defaultTextStyle>
+  <p:extLst>
+    <p:ext uri="{EFAFB233-063F-42B5-8137-9DF3F51BA10A}">
+      <p15:sldGuideLst xmlns:p15="http://schemas.microsoft.com/office/powerpoint/2012/main"/>
+    </p:ext>
+  </p:extLst>
 </p:presentation>
 </file>
 
@@ -128,10 +133,10 @@
           <c:layoutTarget val="inner"/>
           <c:xMode val="edge"/>
           <c:yMode val="edge"/>
-          <c:x val="9.2865813648293966E-2"/>
-          <c:y val="0.16900978286805057"/>
-          <c:w val="0.89185640857392823"/>
-          <c:h val="0.53519923645907885"/>
+          <c:x val="0.11842134733158355"/>
+          <c:y val="0.19281933508311461"/>
+          <c:w val="0.86630087489063867"/>
+          <c:h val="0.51138982627171592"/>
         </c:manualLayout>
       </c:layout>
       <c:barChart>
@@ -264,7 +269,7 @@
               <c:strCache>
                 <c:ptCount val="1"/>
                 <c:pt idx="0">
-                  <c:v>RSOY</c:v>
+                  <c:v>ROY</c:v>
                 </c:pt>
               </c:strCache>
             </c:strRef>
@@ -398,7 +403,7 @@
               <a:lstStyle/>
               <a:p>
                 <a:pPr>
-                  <a:defRPr sz="1400" b="0" i="0" u="none" strike="noStrike" kern="1200" baseline="0">
+                  <a:defRPr sz="2800" b="0" i="0" u="none" strike="noStrike" kern="1200" baseline="0">
                     <a:solidFill>
                       <a:schemeClr val="tx1"/>
                     </a:solidFill>
@@ -427,7 +432,7 @@
             <a:lstStyle/>
             <a:p>
               <a:pPr>
-                <a:defRPr sz="1400" b="0" i="0" u="none" strike="noStrike" kern="1200" baseline="0">
+                <a:defRPr sz="2800" b="0" i="0" u="none" strike="noStrike" kern="1200" baseline="0">
                   <a:solidFill>
                     <a:schemeClr val="tx1"/>
                   </a:solidFill>
@@ -462,7 +467,7 @@
           <a:lstStyle/>
           <a:p>
             <a:pPr>
-              <a:defRPr sz="1400" b="0" i="0" u="none" strike="noStrike" kern="1200" baseline="0">
+              <a:defRPr sz="2400" b="0" i="0" u="none" strike="noStrike" kern="1200" baseline="0">
                 <a:solidFill>
                   <a:schemeClr val="tx1"/>
                 </a:solidFill>
@@ -478,7 +483,7 @@
         <c:crosses val="autoZero"/>
         <c:auto val="1"/>
         <c:lblAlgn val="ctr"/>
-        <c:lblOffset val="100"/>
+        <c:lblOffset val="0"/>
         <c:noMultiLvlLbl val="0"/>
       </c:catAx>
       <c:valAx>
@@ -490,20 +495,6 @@
         </c:scaling>
         <c:delete val="0"/>
         <c:axPos val="l"/>
-        <c:majorGridlines>
-          <c:spPr>
-            <a:ln w="9525" cap="flat" cmpd="sng" algn="ctr">
-              <a:solidFill>
-                <a:schemeClr val="tx1">
-                  <a:lumMod val="15000"/>
-                  <a:lumOff val="85000"/>
-                </a:schemeClr>
-              </a:solidFill>
-              <a:round/>
-            </a:ln>
-            <a:effectLst/>
-          </c:spPr>
-        </c:majorGridlines>
         <c:title>
           <c:tx>
             <c:rich>
@@ -511,7 +502,7 @@
               <a:lstStyle/>
               <a:p>
                 <a:pPr>
-                  <a:defRPr sz="1400" b="0" i="0" u="none" strike="noStrike" kern="1200" baseline="0">
+                  <a:defRPr sz="2800" b="0" i="0" u="none" strike="noStrike" kern="1200" baseline="0">
                     <a:solidFill>
                       <a:schemeClr val="tx1"/>
                     </a:solidFill>
@@ -540,7 +531,7 @@
             <a:lstStyle/>
             <a:p>
               <a:pPr>
-                <a:defRPr sz="1400" b="0" i="0" u="none" strike="noStrike" kern="1200" baseline="0">
+                <a:defRPr sz="2800" b="0" i="0" u="none" strike="noStrike" kern="1200" baseline="0">
                   <a:solidFill>
                     <a:schemeClr val="tx1"/>
                   </a:solidFill>
@@ -569,7 +560,7 @@
           <a:lstStyle/>
           <a:p>
             <a:pPr>
-              <a:defRPr sz="1400" b="0" i="0" u="none" strike="noStrike" kern="1200" baseline="0">
+              <a:defRPr sz="2800" b="0" i="0" u="none" strike="noStrike" kern="1200" baseline="0">
                 <a:solidFill>
                   <a:schemeClr val="tx1"/>
                 </a:solidFill>
@@ -584,7 +575,7 @@
         <c:crossAx val="840044448"/>
         <c:crosses val="autoZero"/>
         <c:crossBetween val="between"/>
-        <c:majorUnit val="15"/>
+        <c:majorUnit val="35"/>
         <c:minorUnit val="5"/>
       </c:valAx>
       <c:spPr>
@@ -614,7 +605,7 @@
         <a:lstStyle/>
         <a:p>
           <a:pPr>
-            <a:defRPr sz="1400" b="0" i="0" u="none" strike="noStrike" kern="1200" baseline="0">
+            <a:defRPr sz="2800" b="0" i="0" u="none" strike="noStrike" kern="1200" baseline="0">
               <a:solidFill>
                 <a:schemeClr val="tx1"/>
               </a:solidFill>
@@ -643,7 +634,7 @@
     <a:lstStyle/>
     <a:p>
       <a:pPr>
-        <a:defRPr sz="1400">
+        <a:defRPr sz="2800">
           <a:solidFill>
             <a:schemeClr val="tx1"/>
           </a:solidFill>
@@ -1230,15 +1221,15 @@
         </p:nvSpPr>
         <p:spPr>
           <a:xfrm>
-            <a:off x="1143000" y="411533"/>
-            <a:ext cx="6858000" cy="875453"/>
+            <a:off x="1428750" y="523770"/>
+            <a:ext cx="8572500" cy="1114213"/>
           </a:xfrm>
         </p:spPr>
         <p:txBody>
           <a:bodyPr anchor="b"/>
           <a:lstStyle>
             <a:lvl1pPr algn="ctr">
-              <a:defRPr sz="2200"/>
+              <a:defRPr sz="2800"/>
             </a:lvl1pPr>
           </a:lstStyle>
           <a:p>
@@ -1262,8 +1253,8 @@
         </p:nvSpPr>
         <p:spPr>
           <a:xfrm>
-            <a:off x="1143000" y="1320747"/>
-            <a:ext cx="6858000" cy="607113"/>
+            <a:off x="1428750" y="1680951"/>
+            <a:ext cx="8572500" cy="772689"/>
           </a:xfrm>
         </p:spPr>
         <p:txBody>
@@ -1271,39 +1262,39 @@
           <a:lstStyle>
             <a:lvl1pPr marL="0" indent="0" algn="ctr">
               <a:buNone/>
-              <a:defRPr sz="880"/>
+              <a:defRPr sz="1120"/>
             </a:lvl1pPr>
-            <a:lvl2pPr marL="167655" indent="0" algn="ctr">
-              <a:buNone/>
-              <a:defRPr sz="733"/>
+            <a:lvl2pPr marL="213375" indent="0" algn="ctr">
+              <a:buNone/>
+              <a:defRPr sz="933"/>
             </a:lvl2pPr>
-            <a:lvl3pPr marL="335310" indent="0" algn="ctr">
-              <a:buNone/>
-              <a:defRPr sz="660"/>
+            <a:lvl3pPr marL="426750" indent="0" algn="ctr">
+              <a:buNone/>
+              <a:defRPr sz="840"/>
             </a:lvl3pPr>
-            <a:lvl4pPr marL="502966" indent="0" algn="ctr">
-              <a:buNone/>
-              <a:defRPr sz="587"/>
+            <a:lvl4pPr marL="640126" indent="0" algn="ctr">
+              <a:buNone/>
+              <a:defRPr sz="747"/>
             </a:lvl4pPr>
-            <a:lvl5pPr marL="670621" indent="0" algn="ctr">
-              <a:buNone/>
-              <a:defRPr sz="587"/>
+            <a:lvl5pPr marL="853501" indent="0" algn="ctr">
+              <a:buNone/>
+              <a:defRPr sz="747"/>
             </a:lvl5pPr>
-            <a:lvl6pPr marL="838276" indent="0" algn="ctr">
-              <a:buNone/>
-              <a:defRPr sz="587"/>
+            <a:lvl6pPr marL="1066876" indent="0" algn="ctr">
+              <a:buNone/>
+              <a:defRPr sz="747"/>
             </a:lvl6pPr>
-            <a:lvl7pPr marL="1005931" indent="0" algn="ctr">
-              <a:buNone/>
-              <a:defRPr sz="587"/>
+            <a:lvl7pPr marL="1280251" indent="0" algn="ctr">
+              <a:buNone/>
+              <a:defRPr sz="747"/>
             </a:lvl7pPr>
-            <a:lvl8pPr marL="1173587" indent="0" algn="ctr">
-              <a:buNone/>
-              <a:defRPr sz="587"/>
+            <a:lvl8pPr marL="1493627" indent="0" algn="ctr">
+              <a:buNone/>
+              <a:defRPr sz="747"/>
             </a:lvl8pPr>
-            <a:lvl9pPr marL="1341242" indent="0" algn="ctr">
-              <a:buNone/>
-              <a:defRPr sz="587"/>
+            <a:lvl9pPr marL="1707002" indent="0" algn="ctr">
+              <a:buNone/>
+              <a:defRPr sz="747"/>
             </a:lvl9pPr>
           </a:lstStyle>
           <a:p>
@@ -1332,7 +1323,7 @@
           <a:p>
             <a:fld id="{6BC25386-7753-4509-9C73-70CC03C1D4EB}" type="datetimeFigureOut">
               <a:rPr lang="en-US" smtClean="0"/>
-              <a:t>2/8/2023</a:t>
+              <a:t>2/15/2023</a:t>
             </a:fld>
             <a:endParaRPr lang="en-US"/>
           </a:p>
@@ -1383,7 +1374,7 @@
     </p:spTree>
     <p:extLst>
       <p:ext uri="{BB962C8B-B14F-4D97-AF65-F5344CB8AC3E}">
-        <p14:creationId xmlns:p14="http://schemas.microsoft.com/office/powerpoint/2010/main" val="4248852794"/>
+        <p14:creationId xmlns:p14="http://schemas.microsoft.com/office/powerpoint/2010/main" val="3610240929"/>
       </p:ext>
     </p:extLst>
   </p:cSld>
@@ -1502,7 +1493,7 @@
           <a:p>
             <a:fld id="{6BC25386-7753-4509-9C73-70CC03C1D4EB}" type="datetimeFigureOut">
               <a:rPr lang="en-US" smtClean="0"/>
-              <a:t>2/8/2023</a:t>
+              <a:t>2/15/2023</a:t>
             </a:fld>
             <a:endParaRPr lang="en-US"/>
           </a:p>
@@ -1553,7 +1544,7 @@
     </p:spTree>
     <p:extLst>
       <p:ext uri="{BB962C8B-B14F-4D97-AF65-F5344CB8AC3E}">
-        <p14:creationId xmlns:p14="http://schemas.microsoft.com/office/powerpoint/2010/main" val="691073315"/>
+        <p14:creationId xmlns:p14="http://schemas.microsoft.com/office/powerpoint/2010/main" val="1280893568"/>
       </p:ext>
     </p:extLst>
   </p:cSld>
@@ -1592,8 +1583,8 @@
         </p:nvSpPr>
         <p:spPr>
           <a:xfrm>
-            <a:off x="6543675" y="133879"/>
-            <a:ext cx="1971675" cy="2131007"/>
+            <a:off x="8179594" y="170392"/>
+            <a:ext cx="2464594" cy="2712191"/>
           </a:xfrm>
         </p:spPr>
         <p:txBody>
@@ -1620,8 +1611,8 @@
         </p:nvSpPr>
         <p:spPr>
           <a:xfrm>
-            <a:off x="628650" y="133879"/>
-            <a:ext cx="5800725" cy="2131007"/>
+            <a:off x="785813" y="170392"/>
+            <a:ext cx="7250906" cy="2712191"/>
           </a:xfrm>
         </p:spPr>
         <p:txBody>
@@ -1682,7 +1673,7 @@
           <a:p>
             <a:fld id="{6BC25386-7753-4509-9C73-70CC03C1D4EB}" type="datetimeFigureOut">
               <a:rPr lang="en-US" smtClean="0"/>
-              <a:t>2/8/2023</a:t>
+              <a:t>2/15/2023</a:t>
             </a:fld>
             <a:endParaRPr lang="en-US"/>
           </a:p>
@@ -1733,7 +1724,7 @@
     </p:spTree>
     <p:extLst>
       <p:ext uri="{BB962C8B-B14F-4D97-AF65-F5344CB8AC3E}">
-        <p14:creationId xmlns:p14="http://schemas.microsoft.com/office/powerpoint/2010/main" val="3694153828"/>
+        <p14:creationId xmlns:p14="http://schemas.microsoft.com/office/powerpoint/2010/main" val="933684812"/>
       </p:ext>
     </p:extLst>
   </p:cSld>
@@ -1852,7 +1843,7 @@
           <a:p>
             <a:fld id="{6BC25386-7753-4509-9C73-70CC03C1D4EB}" type="datetimeFigureOut">
               <a:rPr lang="en-US" smtClean="0"/>
-              <a:t>2/8/2023</a:t>
+              <a:t>2/15/2023</a:t>
             </a:fld>
             <a:endParaRPr lang="en-US"/>
           </a:p>
@@ -1903,7 +1894,7 @@
     </p:spTree>
     <p:extLst>
       <p:ext uri="{BB962C8B-B14F-4D97-AF65-F5344CB8AC3E}">
-        <p14:creationId xmlns:p14="http://schemas.microsoft.com/office/powerpoint/2010/main" val="1324284883"/>
+        <p14:creationId xmlns:p14="http://schemas.microsoft.com/office/powerpoint/2010/main" val="1660552503"/>
       </p:ext>
     </p:extLst>
   </p:cSld>
@@ -1942,15 +1933,15 @@
         </p:nvSpPr>
         <p:spPr>
           <a:xfrm>
-            <a:off x="623888" y="626904"/>
-            <a:ext cx="7886700" cy="1046004"/>
+            <a:off x="779859" y="797878"/>
+            <a:ext cx="9858375" cy="1331277"/>
           </a:xfrm>
         </p:spPr>
         <p:txBody>
           <a:bodyPr anchor="b"/>
           <a:lstStyle>
             <a:lvl1pPr>
-              <a:defRPr sz="2200"/>
+              <a:defRPr sz="2800"/>
             </a:lvl1pPr>
           </a:lstStyle>
           <a:p>
@@ -1974,8 +1965,8 @@
         </p:nvSpPr>
         <p:spPr>
           <a:xfrm>
-            <a:off x="623888" y="1682803"/>
-            <a:ext cx="7886700" cy="550069"/>
+            <a:off x="779859" y="2141750"/>
+            <a:ext cx="9858375" cy="700087"/>
           </a:xfrm>
         </p:spPr>
         <p:txBody>
@@ -1983,7 +1974,7 @@
           <a:lstStyle>
             <a:lvl1pPr marL="0" indent="0">
               <a:buNone/>
-              <a:defRPr sz="880">
+              <a:defRPr sz="1120">
                 <a:solidFill>
                   <a:schemeClr val="tx1">
                     <a:tint val="75000"/>
@@ -1991,9 +1982,9 @@
                 </a:solidFill>
               </a:defRPr>
             </a:lvl1pPr>
-            <a:lvl2pPr marL="167655" indent="0">
-              <a:buNone/>
-              <a:defRPr sz="733">
+            <a:lvl2pPr marL="213375" indent="0">
+              <a:buNone/>
+              <a:defRPr sz="933">
                 <a:solidFill>
                   <a:schemeClr val="tx1">
                     <a:tint val="75000"/>
@@ -2001,9 +1992,9 @@
                 </a:solidFill>
               </a:defRPr>
             </a:lvl2pPr>
-            <a:lvl3pPr marL="335310" indent="0">
-              <a:buNone/>
-              <a:defRPr sz="660">
+            <a:lvl3pPr marL="426750" indent="0">
+              <a:buNone/>
+              <a:defRPr sz="840">
                 <a:solidFill>
                   <a:schemeClr val="tx1">
                     <a:tint val="75000"/>
@@ -2011,9 +2002,9 @@
                 </a:solidFill>
               </a:defRPr>
             </a:lvl3pPr>
-            <a:lvl4pPr marL="502966" indent="0">
-              <a:buNone/>
-              <a:defRPr sz="587">
+            <a:lvl4pPr marL="640126" indent="0">
+              <a:buNone/>
+              <a:defRPr sz="747">
                 <a:solidFill>
                   <a:schemeClr val="tx1">
                     <a:tint val="75000"/>
@@ -2021,9 +2012,9 @@
                 </a:solidFill>
               </a:defRPr>
             </a:lvl4pPr>
-            <a:lvl5pPr marL="670621" indent="0">
-              <a:buNone/>
-              <a:defRPr sz="587">
+            <a:lvl5pPr marL="853501" indent="0">
+              <a:buNone/>
+              <a:defRPr sz="747">
                 <a:solidFill>
                   <a:schemeClr val="tx1">
                     <a:tint val="75000"/>
@@ -2031,9 +2022,9 @@
                 </a:solidFill>
               </a:defRPr>
             </a:lvl5pPr>
-            <a:lvl6pPr marL="838276" indent="0">
-              <a:buNone/>
-              <a:defRPr sz="587">
+            <a:lvl6pPr marL="1066876" indent="0">
+              <a:buNone/>
+              <a:defRPr sz="747">
                 <a:solidFill>
                   <a:schemeClr val="tx1">
                     <a:tint val="75000"/>
@@ -2041,9 +2032,9 @@
                 </a:solidFill>
               </a:defRPr>
             </a:lvl6pPr>
-            <a:lvl7pPr marL="1005931" indent="0">
-              <a:buNone/>
-              <a:defRPr sz="587">
+            <a:lvl7pPr marL="1280251" indent="0">
+              <a:buNone/>
+              <a:defRPr sz="747">
                 <a:solidFill>
                   <a:schemeClr val="tx1">
                     <a:tint val="75000"/>
@@ -2051,9 +2042,9 @@
                 </a:solidFill>
               </a:defRPr>
             </a:lvl7pPr>
-            <a:lvl8pPr marL="1173587" indent="0">
-              <a:buNone/>
-              <a:defRPr sz="587">
+            <a:lvl8pPr marL="1493627" indent="0">
+              <a:buNone/>
+              <a:defRPr sz="747">
                 <a:solidFill>
                   <a:schemeClr val="tx1">
                     <a:tint val="75000"/>
@@ -2061,9 +2052,9 @@
                 </a:solidFill>
               </a:defRPr>
             </a:lvl8pPr>
-            <a:lvl9pPr marL="1341242" indent="0">
-              <a:buNone/>
-              <a:defRPr sz="587">
+            <a:lvl9pPr marL="1707002" indent="0">
+              <a:buNone/>
+              <a:defRPr sz="747">
                 <a:solidFill>
                   <a:schemeClr val="tx1">
                     <a:tint val="75000"/>
@@ -2098,7 +2089,7 @@
           <a:p>
             <a:fld id="{6BC25386-7753-4509-9C73-70CC03C1D4EB}" type="datetimeFigureOut">
               <a:rPr lang="en-US" smtClean="0"/>
-              <a:t>2/8/2023</a:t>
+              <a:t>2/15/2023</a:t>
             </a:fld>
             <a:endParaRPr lang="en-US"/>
           </a:p>
@@ -2149,7 +2140,7 @@
     </p:spTree>
     <p:extLst>
       <p:ext uri="{BB962C8B-B14F-4D97-AF65-F5344CB8AC3E}">
-        <p14:creationId xmlns:p14="http://schemas.microsoft.com/office/powerpoint/2010/main" val="2717655284"/>
+        <p14:creationId xmlns:p14="http://schemas.microsoft.com/office/powerpoint/2010/main" val="2656880857"/>
       </p:ext>
     </p:extLst>
   </p:cSld>
@@ -2211,8 +2202,8 @@
         </p:nvSpPr>
         <p:spPr>
           <a:xfrm>
-            <a:off x="628650" y="669396"/>
-            <a:ext cx="3886200" cy="1595491"/>
+            <a:off x="785813" y="851959"/>
+            <a:ext cx="4857750" cy="2030624"/>
           </a:xfrm>
         </p:spPr>
         <p:txBody>
@@ -2268,8 +2259,8 @@
         </p:nvSpPr>
         <p:spPr>
           <a:xfrm>
-            <a:off x="4629150" y="669396"/>
-            <a:ext cx="3886200" cy="1595491"/>
+            <a:off x="5786438" y="851959"/>
+            <a:ext cx="4857750" cy="2030624"/>
           </a:xfrm>
         </p:spPr>
         <p:txBody>
@@ -2330,7 +2321,7 @@
           <a:p>
             <a:fld id="{6BC25386-7753-4509-9C73-70CC03C1D4EB}" type="datetimeFigureOut">
               <a:rPr lang="en-US" smtClean="0"/>
-              <a:t>2/8/2023</a:t>
+              <a:t>2/15/2023</a:t>
             </a:fld>
             <a:endParaRPr lang="en-US"/>
           </a:p>
@@ -2381,7 +2372,7 @@
     </p:spTree>
     <p:extLst>
       <p:ext uri="{BB962C8B-B14F-4D97-AF65-F5344CB8AC3E}">
-        <p14:creationId xmlns:p14="http://schemas.microsoft.com/office/powerpoint/2010/main" val="91826723"/>
+        <p14:creationId xmlns:p14="http://schemas.microsoft.com/office/powerpoint/2010/main" val="1712180308"/>
       </p:ext>
     </p:extLst>
   </p:cSld>
@@ -2420,8 +2411,8 @@
         </p:nvSpPr>
         <p:spPr>
           <a:xfrm>
-            <a:off x="629841" y="133879"/>
-            <a:ext cx="7886700" cy="486040"/>
+            <a:off x="787301" y="170392"/>
+            <a:ext cx="9858375" cy="618596"/>
           </a:xfrm>
         </p:spPr>
         <p:txBody>
@@ -2448,8 +2439,8 @@
         </p:nvSpPr>
         <p:spPr>
           <a:xfrm>
-            <a:off x="629842" y="616426"/>
-            <a:ext cx="3868340" cy="302101"/>
+            <a:off x="787302" y="784543"/>
+            <a:ext cx="4835425" cy="384492"/>
           </a:xfrm>
         </p:spPr>
         <p:txBody>
@@ -2457,39 +2448,39 @@
           <a:lstStyle>
             <a:lvl1pPr marL="0" indent="0">
               <a:buNone/>
-              <a:defRPr sz="880" b="1"/>
+              <a:defRPr sz="1120" b="1"/>
             </a:lvl1pPr>
-            <a:lvl2pPr marL="167655" indent="0">
-              <a:buNone/>
-              <a:defRPr sz="733" b="1"/>
+            <a:lvl2pPr marL="213375" indent="0">
+              <a:buNone/>
+              <a:defRPr sz="933" b="1"/>
             </a:lvl2pPr>
-            <a:lvl3pPr marL="335310" indent="0">
-              <a:buNone/>
-              <a:defRPr sz="660" b="1"/>
+            <a:lvl3pPr marL="426750" indent="0">
+              <a:buNone/>
+              <a:defRPr sz="840" b="1"/>
             </a:lvl3pPr>
-            <a:lvl4pPr marL="502966" indent="0">
-              <a:buNone/>
-              <a:defRPr sz="587" b="1"/>
+            <a:lvl4pPr marL="640126" indent="0">
+              <a:buNone/>
+              <a:defRPr sz="747" b="1"/>
             </a:lvl4pPr>
-            <a:lvl5pPr marL="670621" indent="0">
-              <a:buNone/>
-              <a:defRPr sz="587" b="1"/>
+            <a:lvl5pPr marL="853501" indent="0">
+              <a:buNone/>
+              <a:defRPr sz="747" b="1"/>
             </a:lvl5pPr>
-            <a:lvl6pPr marL="838276" indent="0">
-              <a:buNone/>
-              <a:defRPr sz="587" b="1"/>
+            <a:lvl6pPr marL="1066876" indent="0">
+              <a:buNone/>
+              <a:defRPr sz="747" b="1"/>
             </a:lvl6pPr>
-            <a:lvl7pPr marL="1005931" indent="0">
-              <a:buNone/>
-              <a:defRPr sz="587" b="1"/>
+            <a:lvl7pPr marL="1280251" indent="0">
+              <a:buNone/>
+              <a:defRPr sz="747" b="1"/>
             </a:lvl7pPr>
-            <a:lvl8pPr marL="1173587" indent="0">
-              <a:buNone/>
-              <a:defRPr sz="587" b="1"/>
+            <a:lvl8pPr marL="1493627" indent="0">
+              <a:buNone/>
+              <a:defRPr sz="747" b="1"/>
             </a:lvl8pPr>
-            <a:lvl9pPr marL="1341242" indent="0">
-              <a:buNone/>
-              <a:defRPr sz="587" b="1"/>
+            <a:lvl9pPr marL="1707002" indent="0">
+              <a:buNone/>
+              <a:defRPr sz="747" b="1"/>
             </a:lvl9pPr>
           </a:lstStyle>
           <a:p>
@@ -2513,8 +2504,8 @@
         </p:nvSpPr>
         <p:spPr>
           <a:xfrm>
-            <a:off x="629842" y="918527"/>
-            <a:ext cx="3868340" cy="1351016"/>
+            <a:off x="787302" y="1169035"/>
+            <a:ext cx="4835425" cy="1719474"/>
           </a:xfrm>
         </p:spPr>
         <p:txBody>
@@ -2570,8 +2561,8 @@
         </p:nvSpPr>
         <p:spPr>
           <a:xfrm>
-            <a:off x="4629150" y="616426"/>
-            <a:ext cx="3887391" cy="302101"/>
+            <a:off x="5786437" y="784543"/>
+            <a:ext cx="4859239" cy="384492"/>
           </a:xfrm>
         </p:spPr>
         <p:txBody>
@@ -2579,39 +2570,39 @@
           <a:lstStyle>
             <a:lvl1pPr marL="0" indent="0">
               <a:buNone/>
-              <a:defRPr sz="880" b="1"/>
+              <a:defRPr sz="1120" b="1"/>
             </a:lvl1pPr>
-            <a:lvl2pPr marL="167655" indent="0">
-              <a:buNone/>
-              <a:defRPr sz="733" b="1"/>
+            <a:lvl2pPr marL="213375" indent="0">
+              <a:buNone/>
+              <a:defRPr sz="933" b="1"/>
             </a:lvl2pPr>
-            <a:lvl3pPr marL="335310" indent="0">
-              <a:buNone/>
-              <a:defRPr sz="660" b="1"/>
+            <a:lvl3pPr marL="426750" indent="0">
+              <a:buNone/>
+              <a:defRPr sz="840" b="1"/>
             </a:lvl3pPr>
-            <a:lvl4pPr marL="502966" indent="0">
-              <a:buNone/>
-              <a:defRPr sz="587" b="1"/>
+            <a:lvl4pPr marL="640126" indent="0">
+              <a:buNone/>
+              <a:defRPr sz="747" b="1"/>
             </a:lvl4pPr>
-            <a:lvl5pPr marL="670621" indent="0">
-              <a:buNone/>
-              <a:defRPr sz="587" b="1"/>
+            <a:lvl5pPr marL="853501" indent="0">
+              <a:buNone/>
+              <a:defRPr sz="747" b="1"/>
             </a:lvl5pPr>
-            <a:lvl6pPr marL="838276" indent="0">
-              <a:buNone/>
-              <a:defRPr sz="587" b="1"/>
+            <a:lvl6pPr marL="1066876" indent="0">
+              <a:buNone/>
+              <a:defRPr sz="747" b="1"/>
             </a:lvl6pPr>
-            <a:lvl7pPr marL="1005931" indent="0">
-              <a:buNone/>
-              <a:defRPr sz="587" b="1"/>
+            <a:lvl7pPr marL="1280251" indent="0">
+              <a:buNone/>
+              <a:defRPr sz="747" b="1"/>
             </a:lvl7pPr>
-            <a:lvl8pPr marL="1173587" indent="0">
-              <a:buNone/>
-              <a:defRPr sz="587" b="1"/>
+            <a:lvl8pPr marL="1493627" indent="0">
+              <a:buNone/>
+              <a:defRPr sz="747" b="1"/>
             </a:lvl8pPr>
-            <a:lvl9pPr marL="1341242" indent="0">
-              <a:buNone/>
-              <a:defRPr sz="587" b="1"/>
+            <a:lvl9pPr marL="1707002" indent="0">
+              <a:buNone/>
+              <a:defRPr sz="747" b="1"/>
             </a:lvl9pPr>
           </a:lstStyle>
           <a:p>
@@ -2635,8 +2626,8 @@
         </p:nvSpPr>
         <p:spPr>
           <a:xfrm>
-            <a:off x="4629150" y="918527"/>
-            <a:ext cx="3887391" cy="1351016"/>
+            <a:off x="5786437" y="1169035"/>
+            <a:ext cx="4859239" cy="1719474"/>
           </a:xfrm>
         </p:spPr>
         <p:txBody>
@@ -2697,7 +2688,7 @@
           <a:p>
             <a:fld id="{6BC25386-7753-4509-9C73-70CC03C1D4EB}" type="datetimeFigureOut">
               <a:rPr lang="en-US" smtClean="0"/>
-              <a:t>2/8/2023</a:t>
+              <a:t>2/15/2023</a:t>
             </a:fld>
             <a:endParaRPr lang="en-US"/>
           </a:p>
@@ -2748,7 +2739,7 @@
     </p:spTree>
     <p:extLst>
       <p:ext uri="{BB962C8B-B14F-4D97-AF65-F5344CB8AC3E}">
-        <p14:creationId xmlns:p14="http://schemas.microsoft.com/office/powerpoint/2010/main" val="1609482444"/>
+        <p14:creationId xmlns:p14="http://schemas.microsoft.com/office/powerpoint/2010/main" val="3802340228"/>
       </p:ext>
     </p:extLst>
   </p:cSld>
@@ -2815,7 +2806,7 @@
           <a:p>
             <a:fld id="{6BC25386-7753-4509-9C73-70CC03C1D4EB}" type="datetimeFigureOut">
               <a:rPr lang="en-US" smtClean="0"/>
-              <a:t>2/8/2023</a:t>
+              <a:t>2/15/2023</a:t>
             </a:fld>
             <a:endParaRPr lang="en-US"/>
           </a:p>
@@ -2866,7 +2857,7 @@
     </p:spTree>
     <p:extLst>
       <p:ext uri="{BB962C8B-B14F-4D97-AF65-F5344CB8AC3E}">
-        <p14:creationId xmlns:p14="http://schemas.microsoft.com/office/powerpoint/2010/main" val="3858781118"/>
+        <p14:creationId xmlns:p14="http://schemas.microsoft.com/office/powerpoint/2010/main" val="3002746786"/>
       </p:ext>
     </p:extLst>
   </p:cSld>
@@ -2910,7 +2901,7 @@
           <a:p>
             <a:fld id="{6BC25386-7753-4509-9C73-70CC03C1D4EB}" type="datetimeFigureOut">
               <a:rPr lang="en-US" smtClean="0"/>
-              <a:t>2/8/2023</a:t>
+              <a:t>2/15/2023</a:t>
             </a:fld>
             <a:endParaRPr lang="en-US"/>
           </a:p>
@@ -2961,7 +2952,7 @@
     </p:spTree>
     <p:extLst>
       <p:ext uri="{BB962C8B-B14F-4D97-AF65-F5344CB8AC3E}">
-        <p14:creationId xmlns:p14="http://schemas.microsoft.com/office/powerpoint/2010/main" val="2358061874"/>
+        <p14:creationId xmlns:p14="http://schemas.microsoft.com/office/powerpoint/2010/main" val="541531007"/>
       </p:ext>
     </p:extLst>
   </p:cSld>
@@ -3000,15 +2991,15 @@
         </p:nvSpPr>
         <p:spPr>
           <a:xfrm>
-            <a:off x="629841" y="167640"/>
-            <a:ext cx="2949178" cy="586740"/>
+            <a:off x="787302" y="213360"/>
+            <a:ext cx="3686472" cy="746760"/>
           </a:xfrm>
         </p:spPr>
         <p:txBody>
           <a:bodyPr anchor="b"/>
           <a:lstStyle>
             <a:lvl1pPr>
-              <a:defRPr sz="1173"/>
+              <a:defRPr sz="1493"/>
             </a:lvl1pPr>
           </a:lstStyle>
           <a:p>
@@ -3032,39 +3023,39 @@
         </p:nvSpPr>
         <p:spPr>
           <a:xfrm>
-            <a:off x="3887391" y="362056"/>
-            <a:ext cx="4629150" cy="1786996"/>
+            <a:off x="4859238" y="460799"/>
+            <a:ext cx="5786438" cy="2274358"/>
           </a:xfrm>
         </p:spPr>
         <p:txBody>
           <a:bodyPr/>
           <a:lstStyle>
             <a:lvl1pPr>
-              <a:defRPr sz="1173"/>
+              <a:defRPr sz="1493"/>
             </a:lvl1pPr>
             <a:lvl2pPr>
-              <a:defRPr sz="1027"/>
+              <a:defRPr sz="1307"/>
             </a:lvl2pPr>
             <a:lvl3pPr>
-              <a:defRPr sz="880"/>
+              <a:defRPr sz="1120"/>
             </a:lvl3pPr>
             <a:lvl4pPr>
-              <a:defRPr sz="733"/>
+              <a:defRPr sz="933"/>
             </a:lvl4pPr>
             <a:lvl5pPr>
-              <a:defRPr sz="733"/>
+              <a:defRPr sz="933"/>
             </a:lvl5pPr>
             <a:lvl6pPr>
-              <a:defRPr sz="733"/>
+              <a:defRPr sz="933"/>
             </a:lvl6pPr>
             <a:lvl7pPr>
-              <a:defRPr sz="733"/>
+              <a:defRPr sz="933"/>
             </a:lvl7pPr>
             <a:lvl8pPr>
-              <a:defRPr sz="733"/>
+              <a:defRPr sz="933"/>
             </a:lvl8pPr>
             <a:lvl9pPr>
-              <a:defRPr sz="733"/>
+              <a:defRPr sz="933"/>
             </a:lvl9pPr>
           </a:lstStyle>
           <a:p>
@@ -3117,8 +3108,8 @@
         </p:nvSpPr>
         <p:spPr>
           <a:xfrm>
-            <a:off x="629841" y="754380"/>
-            <a:ext cx="2949178" cy="1397582"/>
+            <a:off x="787302" y="960120"/>
+            <a:ext cx="3686472" cy="1778741"/>
           </a:xfrm>
         </p:spPr>
         <p:txBody>
@@ -3126,39 +3117,39 @@
           <a:lstStyle>
             <a:lvl1pPr marL="0" indent="0">
               <a:buNone/>
-              <a:defRPr sz="587"/>
+              <a:defRPr sz="747"/>
             </a:lvl1pPr>
-            <a:lvl2pPr marL="167655" indent="0">
-              <a:buNone/>
-              <a:defRPr sz="513"/>
+            <a:lvl2pPr marL="213375" indent="0">
+              <a:buNone/>
+              <a:defRPr sz="653"/>
             </a:lvl2pPr>
-            <a:lvl3pPr marL="335310" indent="0">
-              <a:buNone/>
-              <a:defRPr sz="440"/>
+            <a:lvl3pPr marL="426750" indent="0">
+              <a:buNone/>
+              <a:defRPr sz="560"/>
             </a:lvl3pPr>
-            <a:lvl4pPr marL="502966" indent="0">
-              <a:buNone/>
-              <a:defRPr sz="367"/>
+            <a:lvl4pPr marL="640126" indent="0">
+              <a:buNone/>
+              <a:defRPr sz="467"/>
             </a:lvl4pPr>
-            <a:lvl5pPr marL="670621" indent="0">
-              <a:buNone/>
-              <a:defRPr sz="367"/>
+            <a:lvl5pPr marL="853501" indent="0">
+              <a:buNone/>
+              <a:defRPr sz="467"/>
             </a:lvl5pPr>
-            <a:lvl6pPr marL="838276" indent="0">
-              <a:buNone/>
-              <a:defRPr sz="367"/>
+            <a:lvl6pPr marL="1066876" indent="0">
+              <a:buNone/>
+              <a:defRPr sz="467"/>
             </a:lvl6pPr>
-            <a:lvl7pPr marL="1005931" indent="0">
-              <a:buNone/>
-              <a:defRPr sz="367"/>
+            <a:lvl7pPr marL="1280251" indent="0">
+              <a:buNone/>
+              <a:defRPr sz="467"/>
             </a:lvl7pPr>
-            <a:lvl8pPr marL="1173587" indent="0">
-              <a:buNone/>
-              <a:defRPr sz="367"/>
+            <a:lvl8pPr marL="1493627" indent="0">
+              <a:buNone/>
+              <a:defRPr sz="467"/>
             </a:lvl8pPr>
-            <a:lvl9pPr marL="1341242" indent="0">
-              <a:buNone/>
-              <a:defRPr sz="367"/>
+            <a:lvl9pPr marL="1707002" indent="0">
+              <a:buNone/>
+              <a:defRPr sz="467"/>
             </a:lvl9pPr>
           </a:lstStyle>
           <a:p>
@@ -3187,7 +3178,7 @@
           <a:p>
             <a:fld id="{6BC25386-7753-4509-9C73-70CC03C1D4EB}" type="datetimeFigureOut">
               <a:rPr lang="en-US" smtClean="0"/>
-              <a:t>2/8/2023</a:t>
+              <a:t>2/15/2023</a:t>
             </a:fld>
             <a:endParaRPr lang="en-US"/>
           </a:p>
@@ -3238,7 +3229,7 @@
     </p:spTree>
     <p:extLst>
       <p:ext uri="{BB962C8B-B14F-4D97-AF65-F5344CB8AC3E}">
-        <p14:creationId xmlns:p14="http://schemas.microsoft.com/office/powerpoint/2010/main" val="1897323773"/>
+        <p14:creationId xmlns:p14="http://schemas.microsoft.com/office/powerpoint/2010/main" val="830596018"/>
       </p:ext>
     </p:extLst>
   </p:cSld>
@@ -3277,15 +3268,15 @@
         </p:nvSpPr>
         <p:spPr>
           <a:xfrm>
-            <a:off x="629841" y="167640"/>
-            <a:ext cx="2949178" cy="586740"/>
+            <a:off x="787302" y="213360"/>
+            <a:ext cx="3686472" cy="746760"/>
           </a:xfrm>
         </p:spPr>
         <p:txBody>
           <a:bodyPr anchor="b"/>
           <a:lstStyle>
             <a:lvl1pPr>
-              <a:defRPr sz="1173"/>
+              <a:defRPr sz="1493"/>
             </a:lvl1pPr>
           </a:lstStyle>
           <a:p>
@@ -3309,8 +3300,8 @@
         </p:nvSpPr>
         <p:spPr>
           <a:xfrm>
-            <a:off x="3887391" y="362056"/>
-            <a:ext cx="4629150" cy="1786996"/>
+            <a:off x="4859238" y="460799"/>
+            <a:ext cx="5786438" cy="2274358"/>
           </a:xfrm>
         </p:spPr>
         <p:txBody>
@@ -3318,39 +3309,39 @@
           <a:lstStyle>
             <a:lvl1pPr marL="0" indent="0">
               <a:buNone/>
-              <a:defRPr sz="1173"/>
+              <a:defRPr sz="1493"/>
             </a:lvl1pPr>
-            <a:lvl2pPr marL="167655" indent="0">
-              <a:buNone/>
-              <a:defRPr sz="1027"/>
+            <a:lvl2pPr marL="213375" indent="0">
+              <a:buNone/>
+              <a:defRPr sz="1307"/>
             </a:lvl2pPr>
-            <a:lvl3pPr marL="335310" indent="0">
-              <a:buNone/>
-              <a:defRPr sz="880"/>
+            <a:lvl3pPr marL="426750" indent="0">
+              <a:buNone/>
+              <a:defRPr sz="1120"/>
             </a:lvl3pPr>
-            <a:lvl4pPr marL="502966" indent="0">
-              <a:buNone/>
-              <a:defRPr sz="733"/>
+            <a:lvl4pPr marL="640126" indent="0">
+              <a:buNone/>
+              <a:defRPr sz="933"/>
             </a:lvl4pPr>
-            <a:lvl5pPr marL="670621" indent="0">
-              <a:buNone/>
-              <a:defRPr sz="733"/>
+            <a:lvl5pPr marL="853501" indent="0">
+              <a:buNone/>
+              <a:defRPr sz="933"/>
             </a:lvl5pPr>
-            <a:lvl6pPr marL="838276" indent="0">
-              <a:buNone/>
-              <a:defRPr sz="733"/>
+            <a:lvl6pPr marL="1066876" indent="0">
+              <a:buNone/>
+              <a:defRPr sz="933"/>
             </a:lvl6pPr>
-            <a:lvl7pPr marL="1005931" indent="0">
-              <a:buNone/>
-              <a:defRPr sz="733"/>
+            <a:lvl7pPr marL="1280251" indent="0">
+              <a:buNone/>
+              <a:defRPr sz="933"/>
             </a:lvl7pPr>
-            <a:lvl8pPr marL="1173587" indent="0">
-              <a:buNone/>
-              <a:defRPr sz="733"/>
+            <a:lvl8pPr marL="1493627" indent="0">
+              <a:buNone/>
+              <a:defRPr sz="933"/>
             </a:lvl8pPr>
-            <a:lvl9pPr marL="1341242" indent="0">
-              <a:buNone/>
-              <a:defRPr sz="733"/>
+            <a:lvl9pPr marL="1707002" indent="0">
+              <a:buNone/>
+              <a:defRPr sz="933"/>
             </a:lvl9pPr>
           </a:lstStyle>
           <a:p>
@@ -3374,8 +3365,8 @@
         </p:nvSpPr>
         <p:spPr>
           <a:xfrm>
-            <a:off x="629841" y="754380"/>
-            <a:ext cx="2949178" cy="1397582"/>
+            <a:off x="787302" y="960120"/>
+            <a:ext cx="3686472" cy="1778741"/>
           </a:xfrm>
         </p:spPr>
         <p:txBody>
@@ -3383,39 +3374,39 @@
           <a:lstStyle>
             <a:lvl1pPr marL="0" indent="0">
               <a:buNone/>
-              <a:defRPr sz="587"/>
+              <a:defRPr sz="747"/>
             </a:lvl1pPr>
-            <a:lvl2pPr marL="167655" indent="0">
-              <a:buNone/>
-              <a:defRPr sz="513"/>
+            <a:lvl2pPr marL="213375" indent="0">
+              <a:buNone/>
+              <a:defRPr sz="653"/>
             </a:lvl2pPr>
-            <a:lvl3pPr marL="335310" indent="0">
-              <a:buNone/>
-              <a:defRPr sz="440"/>
+            <a:lvl3pPr marL="426750" indent="0">
+              <a:buNone/>
+              <a:defRPr sz="560"/>
             </a:lvl3pPr>
-            <a:lvl4pPr marL="502966" indent="0">
-              <a:buNone/>
-              <a:defRPr sz="367"/>
+            <a:lvl4pPr marL="640126" indent="0">
+              <a:buNone/>
+              <a:defRPr sz="467"/>
             </a:lvl4pPr>
-            <a:lvl5pPr marL="670621" indent="0">
-              <a:buNone/>
-              <a:defRPr sz="367"/>
+            <a:lvl5pPr marL="853501" indent="0">
+              <a:buNone/>
+              <a:defRPr sz="467"/>
             </a:lvl5pPr>
-            <a:lvl6pPr marL="838276" indent="0">
-              <a:buNone/>
-              <a:defRPr sz="367"/>
+            <a:lvl6pPr marL="1066876" indent="0">
+              <a:buNone/>
+              <a:defRPr sz="467"/>
             </a:lvl6pPr>
-            <a:lvl7pPr marL="1005931" indent="0">
-              <a:buNone/>
-              <a:defRPr sz="367"/>
+            <a:lvl7pPr marL="1280251" indent="0">
+              <a:buNone/>
+              <a:defRPr sz="467"/>
             </a:lvl7pPr>
-            <a:lvl8pPr marL="1173587" indent="0">
-              <a:buNone/>
-              <a:defRPr sz="367"/>
+            <a:lvl8pPr marL="1493627" indent="0">
+              <a:buNone/>
+              <a:defRPr sz="467"/>
             </a:lvl8pPr>
-            <a:lvl9pPr marL="1341242" indent="0">
-              <a:buNone/>
-              <a:defRPr sz="367"/>
+            <a:lvl9pPr marL="1707002" indent="0">
+              <a:buNone/>
+              <a:defRPr sz="467"/>
             </a:lvl9pPr>
           </a:lstStyle>
           <a:p>
@@ -3444,7 +3435,7 @@
           <a:p>
             <a:fld id="{6BC25386-7753-4509-9C73-70CC03C1D4EB}" type="datetimeFigureOut">
               <a:rPr lang="en-US" smtClean="0"/>
-              <a:t>2/8/2023</a:t>
+              <a:t>2/15/2023</a:t>
             </a:fld>
             <a:endParaRPr lang="en-US"/>
           </a:p>
@@ -3495,7 +3486,7 @@
     </p:spTree>
     <p:extLst>
       <p:ext uri="{BB962C8B-B14F-4D97-AF65-F5344CB8AC3E}">
-        <p14:creationId xmlns:p14="http://schemas.microsoft.com/office/powerpoint/2010/main" val="1748793815"/>
+        <p14:creationId xmlns:p14="http://schemas.microsoft.com/office/powerpoint/2010/main" val="2291244455"/>
       </p:ext>
     </p:extLst>
   </p:cSld>
@@ -3539,8 +3530,8 @@
         </p:nvSpPr>
         <p:spPr>
           <a:xfrm>
-            <a:off x="628650" y="133879"/>
-            <a:ext cx="7886700" cy="486040"/>
+            <a:off x="785813" y="170392"/>
+            <a:ext cx="9858375" cy="618596"/>
           </a:xfrm>
           <a:prstGeom prst="rect">
             <a:avLst/>
@@ -3572,8 +3563,8 @@
         </p:nvSpPr>
         <p:spPr>
           <a:xfrm>
-            <a:off x="628650" y="669396"/>
-            <a:ext cx="7886700" cy="1595491"/>
+            <a:off x="785813" y="851959"/>
+            <a:ext cx="9858375" cy="2030624"/>
           </a:xfrm>
           <a:prstGeom prst="rect">
             <a:avLst/>
@@ -3634,8 +3625,8 @@
         </p:nvSpPr>
         <p:spPr>
           <a:xfrm>
-            <a:off x="628650" y="2330662"/>
-            <a:ext cx="2057400" cy="133879"/>
+            <a:off x="785813" y="2966297"/>
+            <a:ext cx="2571750" cy="170392"/>
           </a:xfrm>
           <a:prstGeom prst="rect">
             <a:avLst/>
@@ -3645,7 +3636,7 @@
           <a:bodyPr vert="horz" lIns="91440" tIns="45720" rIns="91440" bIns="45720" rtlCol="0" anchor="ctr"/>
           <a:lstStyle>
             <a:lvl1pPr algn="l">
-              <a:defRPr sz="440">
+              <a:defRPr sz="560">
                 <a:solidFill>
                   <a:schemeClr val="tx1">
                     <a:tint val="75000"/>
@@ -3657,7 +3648,7 @@
           <a:p>
             <a:fld id="{6BC25386-7753-4509-9C73-70CC03C1D4EB}" type="datetimeFigureOut">
               <a:rPr lang="en-US" smtClean="0"/>
-              <a:t>2/8/2023</a:t>
+              <a:t>2/15/2023</a:t>
             </a:fld>
             <a:endParaRPr lang="en-US"/>
           </a:p>
@@ -3675,8 +3666,8 @@
         </p:nvSpPr>
         <p:spPr>
           <a:xfrm>
-            <a:off x="3028950" y="2330662"/>
-            <a:ext cx="3086100" cy="133879"/>
+            <a:off x="3786188" y="2966297"/>
+            <a:ext cx="3857625" cy="170392"/>
           </a:xfrm>
           <a:prstGeom prst="rect">
             <a:avLst/>
@@ -3686,7 +3677,7 @@
           <a:bodyPr vert="horz" lIns="91440" tIns="45720" rIns="91440" bIns="45720" rtlCol="0" anchor="ctr"/>
           <a:lstStyle>
             <a:lvl1pPr algn="ctr">
-              <a:defRPr sz="440">
+              <a:defRPr sz="560">
                 <a:solidFill>
                   <a:schemeClr val="tx1">
                     <a:tint val="75000"/>
@@ -3712,8 +3703,8 @@
         </p:nvSpPr>
         <p:spPr>
           <a:xfrm>
-            <a:off x="6457950" y="2330662"/>
-            <a:ext cx="2057400" cy="133879"/>
+            <a:off x="8072438" y="2966297"/>
+            <a:ext cx="2571750" cy="170392"/>
           </a:xfrm>
           <a:prstGeom prst="rect">
             <a:avLst/>
@@ -3723,7 +3714,7 @@
           <a:bodyPr vert="horz" lIns="91440" tIns="45720" rIns="91440" bIns="45720" rtlCol="0" anchor="ctr"/>
           <a:lstStyle>
             <a:lvl1pPr algn="r">
-              <a:defRPr sz="440">
+              <a:defRPr sz="560">
                 <a:solidFill>
                   <a:schemeClr val="tx1">
                     <a:tint val="75000"/>
@@ -3744,27 +3735,27 @@
     </p:spTree>
     <p:extLst>
       <p:ext uri="{BB962C8B-B14F-4D97-AF65-F5344CB8AC3E}">
-        <p14:creationId xmlns:p14="http://schemas.microsoft.com/office/powerpoint/2010/main" val="276076634"/>
+        <p14:creationId xmlns:p14="http://schemas.microsoft.com/office/powerpoint/2010/main" val="4034281375"/>
       </p:ext>
     </p:extLst>
   </p:cSld>
   <p:clrMap bg1="lt1" tx1="dk1" bg2="lt2" tx2="dk2" accent1="accent1" accent2="accent2" accent3="accent3" accent4="accent4" accent5="accent5" accent6="accent6" hlink="hlink" folHlink="folHlink"/>
   <p:sldLayoutIdLst>
-    <p:sldLayoutId id="2147483673" r:id="rId1"/>
-    <p:sldLayoutId id="2147483674" r:id="rId2"/>
-    <p:sldLayoutId id="2147483675" r:id="rId3"/>
-    <p:sldLayoutId id="2147483676" r:id="rId4"/>
-    <p:sldLayoutId id="2147483677" r:id="rId5"/>
-    <p:sldLayoutId id="2147483678" r:id="rId6"/>
-    <p:sldLayoutId id="2147483679" r:id="rId7"/>
-    <p:sldLayoutId id="2147483680" r:id="rId8"/>
-    <p:sldLayoutId id="2147483681" r:id="rId9"/>
-    <p:sldLayoutId id="2147483682" r:id="rId10"/>
-    <p:sldLayoutId id="2147483683" r:id="rId11"/>
+    <p:sldLayoutId id="2147483697" r:id="rId1"/>
+    <p:sldLayoutId id="2147483698" r:id="rId2"/>
+    <p:sldLayoutId id="2147483699" r:id="rId3"/>
+    <p:sldLayoutId id="2147483700" r:id="rId4"/>
+    <p:sldLayoutId id="2147483701" r:id="rId5"/>
+    <p:sldLayoutId id="2147483702" r:id="rId6"/>
+    <p:sldLayoutId id="2147483703" r:id="rId7"/>
+    <p:sldLayoutId id="2147483704" r:id="rId8"/>
+    <p:sldLayoutId id="2147483705" r:id="rId9"/>
+    <p:sldLayoutId id="2147483706" r:id="rId10"/>
+    <p:sldLayoutId id="2147483707" r:id="rId11"/>
   </p:sldLayoutIdLst>
   <p:txStyles>
     <p:titleStyle>
-      <a:lvl1pPr algn="l" defTabSz="335310" rtl="0" eaLnBrk="1" latinLnBrk="0" hangingPunct="1">
+      <a:lvl1pPr algn="l" defTabSz="426750" rtl="0" eaLnBrk="1" latinLnBrk="0" hangingPunct="1">
         <a:lnSpc>
           <a:spcPct val="90000"/>
         </a:lnSpc>
@@ -3772,7 +3763,7 @@
           <a:spcPct val="0"/>
         </a:spcBef>
         <a:buNone/>
-        <a:defRPr sz="1613" kern="1200">
+        <a:defRPr sz="2053" kern="1200">
           <a:solidFill>
             <a:schemeClr val="tx1"/>
           </a:solidFill>
@@ -3783,16 +3774,16 @@
       </a:lvl1pPr>
     </p:titleStyle>
     <p:bodyStyle>
-      <a:lvl1pPr marL="83828" indent="-83828" algn="l" defTabSz="335310" rtl="0" eaLnBrk="1" latinLnBrk="0" hangingPunct="1">
+      <a:lvl1pPr marL="106688" indent="-106688" algn="l" defTabSz="426750" rtl="0" eaLnBrk="1" latinLnBrk="0" hangingPunct="1">
         <a:lnSpc>
           <a:spcPct val="90000"/>
         </a:lnSpc>
         <a:spcBef>
-          <a:spcPts val="367"/>
+          <a:spcPts val="467"/>
         </a:spcBef>
         <a:buFont typeface="Arial" panose="020B0604020202020204" pitchFamily="34" charset="0"/>
         <a:buChar char="•"/>
-        <a:defRPr sz="1027" kern="1200">
+        <a:defRPr sz="1307" kern="1200">
           <a:solidFill>
             <a:schemeClr val="tx1"/>
           </a:solidFill>
@@ -3801,16 +3792,16 @@
           <a:cs typeface="+mn-cs"/>
         </a:defRPr>
       </a:lvl1pPr>
-      <a:lvl2pPr marL="251483" indent="-83828" algn="l" defTabSz="335310" rtl="0" eaLnBrk="1" latinLnBrk="0" hangingPunct="1">
+      <a:lvl2pPr marL="320063" indent="-106688" algn="l" defTabSz="426750" rtl="0" eaLnBrk="1" latinLnBrk="0" hangingPunct="1">
         <a:lnSpc>
           <a:spcPct val="90000"/>
         </a:lnSpc>
         <a:spcBef>
-          <a:spcPts val="183"/>
+          <a:spcPts val="233"/>
         </a:spcBef>
         <a:buFont typeface="Arial" panose="020B0604020202020204" pitchFamily="34" charset="0"/>
         <a:buChar char="•"/>
-        <a:defRPr sz="880" kern="1200">
+        <a:defRPr sz="1120" kern="1200">
           <a:solidFill>
             <a:schemeClr val="tx1"/>
           </a:solidFill>
@@ -3819,16 +3810,16 @@
           <a:cs typeface="+mn-cs"/>
         </a:defRPr>
       </a:lvl2pPr>
-      <a:lvl3pPr marL="419138" indent="-83828" algn="l" defTabSz="335310" rtl="0" eaLnBrk="1" latinLnBrk="0" hangingPunct="1">
+      <a:lvl3pPr marL="533438" indent="-106688" algn="l" defTabSz="426750" rtl="0" eaLnBrk="1" latinLnBrk="0" hangingPunct="1">
         <a:lnSpc>
           <a:spcPct val="90000"/>
         </a:lnSpc>
         <a:spcBef>
-          <a:spcPts val="183"/>
+          <a:spcPts val="233"/>
         </a:spcBef>
         <a:buFont typeface="Arial" panose="020B0604020202020204" pitchFamily="34" charset="0"/>
         <a:buChar char="•"/>
-        <a:defRPr sz="733" kern="1200">
+        <a:defRPr sz="933" kern="1200">
           <a:solidFill>
             <a:schemeClr val="tx1"/>
           </a:solidFill>
@@ -3837,16 +3828,16 @@
           <a:cs typeface="+mn-cs"/>
         </a:defRPr>
       </a:lvl3pPr>
-      <a:lvl4pPr marL="586793" indent="-83828" algn="l" defTabSz="335310" rtl="0" eaLnBrk="1" latinLnBrk="0" hangingPunct="1">
+      <a:lvl4pPr marL="746813" indent="-106688" algn="l" defTabSz="426750" rtl="0" eaLnBrk="1" latinLnBrk="0" hangingPunct="1">
         <a:lnSpc>
           <a:spcPct val="90000"/>
         </a:lnSpc>
         <a:spcBef>
-          <a:spcPts val="183"/>
+          <a:spcPts val="233"/>
         </a:spcBef>
         <a:buFont typeface="Arial" panose="020B0604020202020204" pitchFamily="34" charset="0"/>
         <a:buChar char="•"/>
-        <a:defRPr sz="660" kern="1200">
+        <a:defRPr sz="840" kern="1200">
           <a:solidFill>
             <a:schemeClr val="tx1"/>
           </a:solidFill>
@@ -3855,16 +3846,16 @@
           <a:cs typeface="+mn-cs"/>
         </a:defRPr>
       </a:lvl4pPr>
-      <a:lvl5pPr marL="754449" indent="-83828" algn="l" defTabSz="335310" rtl="0" eaLnBrk="1" latinLnBrk="0" hangingPunct="1">
+      <a:lvl5pPr marL="960189" indent="-106688" algn="l" defTabSz="426750" rtl="0" eaLnBrk="1" latinLnBrk="0" hangingPunct="1">
         <a:lnSpc>
           <a:spcPct val="90000"/>
         </a:lnSpc>
         <a:spcBef>
-          <a:spcPts val="183"/>
+          <a:spcPts val="233"/>
         </a:spcBef>
         <a:buFont typeface="Arial" panose="020B0604020202020204" pitchFamily="34" charset="0"/>
         <a:buChar char="•"/>
-        <a:defRPr sz="660" kern="1200">
+        <a:defRPr sz="840" kern="1200">
           <a:solidFill>
             <a:schemeClr val="tx1"/>
           </a:solidFill>
@@ -3873,16 +3864,16 @@
           <a:cs typeface="+mn-cs"/>
         </a:defRPr>
       </a:lvl5pPr>
-      <a:lvl6pPr marL="922104" indent="-83828" algn="l" defTabSz="335310" rtl="0" eaLnBrk="1" latinLnBrk="0" hangingPunct="1">
+      <a:lvl6pPr marL="1173564" indent="-106688" algn="l" defTabSz="426750" rtl="0" eaLnBrk="1" latinLnBrk="0" hangingPunct="1">
         <a:lnSpc>
           <a:spcPct val="90000"/>
         </a:lnSpc>
         <a:spcBef>
-          <a:spcPts val="183"/>
+          <a:spcPts val="233"/>
         </a:spcBef>
         <a:buFont typeface="Arial" panose="020B0604020202020204" pitchFamily="34" charset="0"/>
         <a:buChar char="•"/>
-        <a:defRPr sz="660" kern="1200">
+        <a:defRPr sz="840" kern="1200">
           <a:solidFill>
             <a:schemeClr val="tx1"/>
           </a:solidFill>
@@ -3891,16 +3882,16 @@
           <a:cs typeface="+mn-cs"/>
         </a:defRPr>
       </a:lvl6pPr>
-      <a:lvl7pPr marL="1089759" indent="-83828" algn="l" defTabSz="335310" rtl="0" eaLnBrk="1" latinLnBrk="0" hangingPunct="1">
+      <a:lvl7pPr marL="1386939" indent="-106688" algn="l" defTabSz="426750" rtl="0" eaLnBrk="1" latinLnBrk="0" hangingPunct="1">
         <a:lnSpc>
           <a:spcPct val="90000"/>
         </a:lnSpc>
         <a:spcBef>
-          <a:spcPts val="183"/>
+          <a:spcPts val="233"/>
         </a:spcBef>
         <a:buFont typeface="Arial" panose="020B0604020202020204" pitchFamily="34" charset="0"/>
         <a:buChar char="•"/>
-        <a:defRPr sz="660" kern="1200">
+        <a:defRPr sz="840" kern="1200">
           <a:solidFill>
             <a:schemeClr val="tx1"/>
           </a:solidFill>
@@ -3909,16 +3900,16 @@
           <a:cs typeface="+mn-cs"/>
         </a:defRPr>
       </a:lvl7pPr>
-      <a:lvl8pPr marL="1257414" indent="-83828" algn="l" defTabSz="335310" rtl="0" eaLnBrk="1" latinLnBrk="0" hangingPunct="1">
+      <a:lvl8pPr marL="1600314" indent="-106688" algn="l" defTabSz="426750" rtl="0" eaLnBrk="1" latinLnBrk="0" hangingPunct="1">
         <a:lnSpc>
           <a:spcPct val="90000"/>
         </a:lnSpc>
         <a:spcBef>
-          <a:spcPts val="183"/>
+          <a:spcPts val="233"/>
         </a:spcBef>
         <a:buFont typeface="Arial" panose="020B0604020202020204" pitchFamily="34" charset="0"/>
         <a:buChar char="•"/>
-        <a:defRPr sz="660" kern="1200">
+        <a:defRPr sz="840" kern="1200">
           <a:solidFill>
             <a:schemeClr val="tx1"/>
           </a:solidFill>
@@ -3927,16 +3918,16 @@
           <a:cs typeface="+mn-cs"/>
         </a:defRPr>
       </a:lvl8pPr>
-      <a:lvl9pPr marL="1425070" indent="-83828" algn="l" defTabSz="335310" rtl="0" eaLnBrk="1" latinLnBrk="0" hangingPunct="1">
+      <a:lvl9pPr marL="1813690" indent="-106688" algn="l" defTabSz="426750" rtl="0" eaLnBrk="1" latinLnBrk="0" hangingPunct="1">
         <a:lnSpc>
           <a:spcPct val="90000"/>
         </a:lnSpc>
         <a:spcBef>
-          <a:spcPts val="183"/>
+          <a:spcPts val="233"/>
         </a:spcBef>
         <a:buFont typeface="Arial" panose="020B0604020202020204" pitchFamily="34" charset="0"/>
         <a:buChar char="•"/>
-        <a:defRPr sz="660" kern="1200">
+        <a:defRPr sz="840" kern="1200">
           <a:solidFill>
             <a:schemeClr val="tx1"/>
           </a:solidFill>
@@ -3950,8 +3941,8 @@
       <a:defPPr>
         <a:defRPr lang="en-US"/>
       </a:defPPr>
-      <a:lvl1pPr marL="0" algn="l" defTabSz="335310" rtl="0" eaLnBrk="1" latinLnBrk="0" hangingPunct="1">
-        <a:defRPr sz="660" kern="1200">
+      <a:lvl1pPr marL="0" algn="l" defTabSz="426750" rtl="0" eaLnBrk="1" latinLnBrk="0" hangingPunct="1">
+        <a:defRPr sz="840" kern="1200">
           <a:solidFill>
             <a:schemeClr val="tx1"/>
           </a:solidFill>
@@ -3960,8 +3951,8 @@
           <a:cs typeface="+mn-cs"/>
         </a:defRPr>
       </a:lvl1pPr>
-      <a:lvl2pPr marL="167655" algn="l" defTabSz="335310" rtl="0" eaLnBrk="1" latinLnBrk="0" hangingPunct="1">
-        <a:defRPr sz="660" kern="1200">
+      <a:lvl2pPr marL="213375" algn="l" defTabSz="426750" rtl="0" eaLnBrk="1" latinLnBrk="0" hangingPunct="1">
+        <a:defRPr sz="840" kern="1200">
           <a:solidFill>
             <a:schemeClr val="tx1"/>
           </a:solidFill>
@@ -3970,8 +3961,8 @@
           <a:cs typeface="+mn-cs"/>
         </a:defRPr>
       </a:lvl2pPr>
-      <a:lvl3pPr marL="335310" algn="l" defTabSz="335310" rtl="0" eaLnBrk="1" latinLnBrk="0" hangingPunct="1">
-        <a:defRPr sz="660" kern="1200">
+      <a:lvl3pPr marL="426750" algn="l" defTabSz="426750" rtl="0" eaLnBrk="1" latinLnBrk="0" hangingPunct="1">
+        <a:defRPr sz="840" kern="1200">
           <a:solidFill>
             <a:schemeClr val="tx1"/>
           </a:solidFill>
@@ -3980,8 +3971,8 @@
           <a:cs typeface="+mn-cs"/>
         </a:defRPr>
       </a:lvl3pPr>
-      <a:lvl4pPr marL="502966" algn="l" defTabSz="335310" rtl="0" eaLnBrk="1" latinLnBrk="0" hangingPunct="1">
-        <a:defRPr sz="660" kern="1200">
+      <a:lvl4pPr marL="640126" algn="l" defTabSz="426750" rtl="0" eaLnBrk="1" latinLnBrk="0" hangingPunct="1">
+        <a:defRPr sz="840" kern="1200">
           <a:solidFill>
             <a:schemeClr val="tx1"/>
           </a:solidFill>
@@ -3990,8 +3981,8 @@
           <a:cs typeface="+mn-cs"/>
         </a:defRPr>
       </a:lvl4pPr>
-      <a:lvl5pPr marL="670621" algn="l" defTabSz="335310" rtl="0" eaLnBrk="1" latinLnBrk="0" hangingPunct="1">
-        <a:defRPr sz="660" kern="1200">
+      <a:lvl5pPr marL="853501" algn="l" defTabSz="426750" rtl="0" eaLnBrk="1" latinLnBrk="0" hangingPunct="1">
+        <a:defRPr sz="840" kern="1200">
           <a:solidFill>
             <a:schemeClr val="tx1"/>
           </a:solidFill>
@@ -4000,8 +3991,8 @@
           <a:cs typeface="+mn-cs"/>
         </a:defRPr>
       </a:lvl5pPr>
-      <a:lvl6pPr marL="838276" algn="l" defTabSz="335310" rtl="0" eaLnBrk="1" latinLnBrk="0" hangingPunct="1">
-        <a:defRPr sz="660" kern="1200">
+      <a:lvl6pPr marL="1066876" algn="l" defTabSz="426750" rtl="0" eaLnBrk="1" latinLnBrk="0" hangingPunct="1">
+        <a:defRPr sz="840" kern="1200">
           <a:solidFill>
             <a:schemeClr val="tx1"/>
           </a:solidFill>
@@ -4010,8 +4001,8 @@
           <a:cs typeface="+mn-cs"/>
         </a:defRPr>
       </a:lvl6pPr>
-      <a:lvl7pPr marL="1005931" algn="l" defTabSz="335310" rtl="0" eaLnBrk="1" latinLnBrk="0" hangingPunct="1">
-        <a:defRPr sz="660" kern="1200">
+      <a:lvl7pPr marL="1280251" algn="l" defTabSz="426750" rtl="0" eaLnBrk="1" latinLnBrk="0" hangingPunct="1">
+        <a:defRPr sz="840" kern="1200">
           <a:solidFill>
             <a:schemeClr val="tx1"/>
           </a:solidFill>
@@ -4020,8 +4011,8 @@
           <a:cs typeface="+mn-cs"/>
         </a:defRPr>
       </a:lvl7pPr>
-      <a:lvl8pPr marL="1173587" algn="l" defTabSz="335310" rtl="0" eaLnBrk="1" latinLnBrk="0" hangingPunct="1">
-        <a:defRPr sz="660" kern="1200">
+      <a:lvl8pPr marL="1493627" algn="l" defTabSz="426750" rtl="0" eaLnBrk="1" latinLnBrk="0" hangingPunct="1">
+        <a:defRPr sz="840" kern="1200">
           <a:solidFill>
             <a:schemeClr val="tx1"/>
           </a:solidFill>
@@ -4030,8 +4021,8 @@
           <a:cs typeface="+mn-cs"/>
         </a:defRPr>
       </a:lvl8pPr>
-      <a:lvl9pPr marL="1341242" algn="l" defTabSz="335310" rtl="0" eaLnBrk="1" latinLnBrk="0" hangingPunct="1">
-        <a:defRPr sz="660" kern="1200">
+      <a:lvl9pPr marL="1707002" algn="l" defTabSz="426750" rtl="0" eaLnBrk="1" latinLnBrk="0" hangingPunct="1">
+        <a:defRPr sz="840" kern="1200">
           <a:solidFill>
             <a:schemeClr val="tx1"/>
           </a:solidFill>
@@ -4077,14 +4068,14 @@
           <p:nvPr>
             <p:extLst>
               <p:ext uri="{D42A27DB-BD31-4B8C-83A1-F6EECF244321}">
-                <p14:modId xmlns:p14="http://schemas.microsoft.com/office/powerpoint/2010/main" val="2688019756"/>
+                <p14:modId xmlns:p14="http://schemas.microsoft.com/office/powerpoint/2010/main" val="1519746065"/>
               </p:ext>
             </p:extLst>
           </p:nvPr>
         </p:nvGraphicFramePr>
         <p:xfrm>
-          <a:off x="0" y="0"/>
-          <a:ext cx="9144000" cy="2514600"/>
+          <a:off x="1" y="0"/>
+          <a:ext cx="11430000" cy="3200400"/>
         </p:xfrm>
         <a:graphic>
           <a:graphicData uri="http://schemas.openxmlformats.org/drawingml/2006/chart">

</xml_diff>